<commit_message>
power point presentation update
</commit_message>
<xml_diff>
--- a/Docs/Data Extraction for the Quantified Self v2.pptx
+++ b/Docs/Data Extraction for the Quantified Self v2.pptx
@@ -13,10 +13,12 @@
     <p:sldId id="259" r:id="rId7"/>
     <p:sldId id="264" r:id="rId8"/>
     <p:sldId id="266" r:id="rId9"/>
-    <p:sldId id="263" r:id="rId10"/>
-    <p:sldId id="260" r:id="rId11"/>
+    <p:sldId id="260" r:id="rId10"/>
+    <p:sldId id="269" r:id="rId11"/>
     <p:sldId id="267" r:id="rId12"/>
-    <p:sldId id="261" r:id="rId13"/>
+    <p:sldId id="268" r:id="rId13"/>
+    <p:sldId id="270" r:id="rId14"/>
+    <p:sldId id="261" r:id="rId15"/>
   </p:sldIdLst>
   <p:sldSz cx="9144000" cy="6858000" type="screen4x3"/>
   <p:notesSz cx="6858000" cy="9144000"/>
@@ -2875,7 +2877,7 @@
           <a:p>
             <a:fld id="{9284C280-8E67-4809-8607-67EF543FE5FF}" type="datetimeFigureOut">
               <a:rPr lang="en-US" smtClean="0"/>
-              <a:t>7/15/2013</a:t>
+              <a:t>7/16/2013</a:t>
             </a:fld>
             <a:endParaRPr lang="en-US"/>
           </a:p>
@@ -3160,7 +3162,7 @@
           <a:p>
             <a:fld id="{9284C280-8E67-4809-8607-67EF543FE5FF}" type="datetimeFigureOut">
               <a:rPr lang="en-US" smtClean="0"/>
-              <a:t>7/15/2013</a:t>
+              <a:t>7/16/2013</a:t>
             </a:fld>
             <a:endParaRPr lang="en-US"/>
           </a:p>
@@ -3335,7 +3337,7 @@
           <a:p>
             <a:fld id="{9284C280-8E67-4809-8607-67EF543FE5FF}" type="datetimeFigureOut">
               <a:rPr lang="en-US" smtClean="0"/>
-              <a:t>7/15/2013</a:t>
+              <a:t>7/16/2013</a:t>
             </a:fld>
             <a:endParaRPr lang="en-US"/>
           </a:p>
@@ -3500,7 +3502,7 @@
           <a:p>
             <a:fld id="{9284C280-8E67-4809-8607-67EF543FE5FF}" type="datetimeFigureOut">
               <a:rPr lang="en-US" smtClean="0"/>
-              <a:t>7/15/2013</a:t>
+              <a:t>7/16/2013</a:t>
             </a:fld>
             <a:endParaRPr lang="en-US"/>
           </a:p>
@@ -3741,7 +3743,7 @@
           <a:p>
             <a:fld id="{9284C280-8E67-4809-8607-67EF543FE5FF}" type="datetimeFigureOut">
               <a:rPr lang="en-US" smtClean="0"/>
-              <a:t>7/15/2013</a:t>
+              <a:t>7/16/2013</a:t>
             </a:fld>
             <a:endParaRPr lang="en-US"/>
           </a:p>
@@ -3854,7 +3856,7 @@
           <a:p>
             <a:fld id="{9284C280-8E67-4809-8607-67EF543FE5FF}" type="datetimeFigureOut">
               <a:rPr lang="en-US" smtClean="0"/>
-              <a:t>7/15/2013</a:t>
+              <a:t>7/16/2013</a:t>
             </a:fld>
             <a:endParaRPr lang="en-US"/>
           </a:p>
@@ -4393,7 +4395,7 @@
           <a:p>
             <a:fld id="{9284C280-8E67-4809-8607-67EF543FE5FF}" type="datetimeFigureOut">
               <a:rPr lang="en-US" smtClean="0"/>
-              <a:t>7/15/2013</a:t>
+              <a:t>7/16/2013</a:t>
             </a:fld>
             <a:endParaRPr lang="en-US"/>
           </a:p>
@@ -4506,7 +4508,7 @@
           <a:p>
             <a:fld id="{9284C280-8E67-4809-8607-67EF543FE5FF}" type="datetimeFigureOut">
               <a:rPr lang="en-US" smtClean="0"/>
-              <a:t>7/15/2013</a:t>
+              <a:t>7/16/2013</a:t>
             </a:fld>
             <a:endParaRPr lang="en-US"/>
           </a:p>
@@ -4596,7 +4598,7 @@
           <a:p>
             <a:fld id="{9284C280-8E67-4809-8607-67EF543FE5FF}" type="datetimeFigureOut">
               <a:rPr lang="en-US" smtClean="0"/>
-              <a:t>7/15/2013</a:t>
+              <a:t>7/16/2013</a:t>
             </a:fld>
             <a:endParaRPr lang="en-US"/>
           </a:p>
@@ -7247,7 +7249,7 @@
           <a:p>
             <a:fld id="{9284C280-8E67-4809-8607-67EF543FE5FF}" type="datetimeFigureOut">
               <a:rPr lang="en-US" smtClean="0"/>
-              <a:t>7/15/2013</a:t>
+              <a:t>7/16/2013</a:t>
             </a:fld>
             <a:endParaRPr lang="en-US"/>
           </a:p>
@@ -10459,7 +10461,7 @@
           <a:p>
             <a:fld id="{9284C280-8E67-4809-8607-67EF543FE5FF}" type="datetimeFigureOut">
               <a:rPr lang="en-US" smtClean="0"/>
-              <a:t>7/15/2013</a:t>
+              <a:t>7/16/2013</a:t>
             </a:fld>
             <a:endParaRPr lang="en-US"/>
           </a:p>
@@ -13281,7 +13283,7 @@
           <a:p>
             <a:fld id="{9284C280-8E67-4809-8607-67EF543FE5FF}" type="datetimeFigureOut">
               <a:rPr lang="en-US" smtClean="0"/>
-              <a:t>7/15/2013</a:t>
+              <a:t>7/16/2013</a:t>
             </a:fld>
             <a:endParaRPr lang="en-US"/>
           </a:p>
@@ -13839,7 +13841,7 @@
       </p:grpSpPr>
       <p:sp>
         <p:nvSpPr>
-          <p:cNvPr id="2" name="Title 1"/>
+          <p:cNvPr id="2" name="Заголовок 1"/>
           <p:cNvSpPr>
             <a:spLocks noGrp="1"/>
           </p:cNvSpPr>
@@ -13847,59 +13849,513 @@
             <p:ph type="title"/>
           </p:nvPr>
         </p:nvSpPr>
-        <p:spPr/>
+        <p:spPr>
+          <a:xfrm>
+            <a:off x="1043490" y="1027664"/>
+            <a:ext cx="7024744" cy="828000"/>
+          </a:xfrm>
+        </p:spPr>
         <p:txBody>
           <a:bodyPr/>
           <a:lstStyle/>
           <a:p>
             <a:r>
-              <a:rPr lang="en-US" dirty="0" smtClean="0"/>
+              <a:rPr lang="en-US" dirty="0"/>
               <a:t>3. Experiments</a:t>
             </a:r>
-            <a:endParaRPr lang="en-US" dirty="0"/>
+            <a:endParaRPr lang="ru-RU" dirty="0"/>
+          </a:p>
+        </p:txBody>
+      </p:sp>
+      <p:pic>
+        <p:nvPicPr>
+          <p:cNvPr id="4" name="Объект 3"/>
+          <p:cNvPicPr>
+            <a:picLocks noGrp="1" noChangeAspect="1"/>
+          </p:cNvPicPr>
+          <p:nvPr>
+            <p:ph idx="1"/>
+          </p:nvPr>
+        </p:nvPicPr>
+        <p:blipFill>
+          <a:blip r:embed="rId2">
+            <a:extLst>
+              <a:ext uri="{28A0092B-C50C-407E-A947-70E740481C1C}">
+                <a14:useLocalDpi xmlns:a14="http://schemas.microsoft.com/office/drawing/2010/main" val="0"/>
+              </a:ext>
+            </a:extLst>
+          </a:blip>
+          <a:stretch>
+            <a:fillRect/>
+          </a:stretch>
+        </p:blipFill>
+        <p:spPr>
+          <a:xfrm>
+            <a:off x="1187624" y="2996952"/>
+            <a:ext cx="6777037" cy="2160094"/>
+          </a:xfrm>
+        </p:spPr>
+      </p:pic>
+      <p:sp>
+        <p:nvSpPr>
+          <p:cNvPr id="6" name="Прямоугольник 5"/>
+          <p:cNvSpPr/>
+          <p:nvPr/>
+        </p:nvSpPr>
+        <p:spPr>
+          <a:xfrm>
+            <a:off x="3419872" y="2343859"/>
+            <a:ext cx="1224136" cy="432048"/>
+          </a:xfrm>
+          <a:prstGeom prst="rect">
+            <a:avLst/>
+          </a:prstGeom>
+          <a:noFill/>
+          <a:ln>
+            <a:noFill/>
+          </a:ln>
+        </p:spPr>
+        <p:style>
+          <a:lnRef idx="2">
+            <a:schemeClr val="accent1">
+              <a:shade val="50000"/>
+            </a:schemeClr>
+          </a:lnRef>
+          <a:fillRef idx="1">
+            <a:schemeClr val="accent1"/>
+          </a:fillRef>
+          <a:effectRef idx="0">
+            <a:schemeClr val="accent1"/>
+          </a:effectRef>
+          <a:fontRef idx="minor">
+            <a:schemeClr val="lt1"/>
+          </a:fontRef>
+        </p:style>
+        <p:txBody>
+          <a:bodyPr rtlCol="0" anchor="ctr"/>
+          <a:lstStyle/>
+          <a:p>
+            <a:pPr algn="ctr"/>
+            <a:r>
+              <a:rPr lang="en-US" dirty="0" smtClean="0">
+                <a:solidFill>
+                  <a:schemeClr val="tx1">
+                    <a:lumMod val="50000"/>
+                    <a:lumOff val="50000"/>
+                  </a:schemeClr>
+                </a:solidFill>
+              </a:rPr>
+              <a:t>attributes</a:t>
+            </a:r>
+            <a:endParaRPr lang="ru-RU" dirty="0">
+              <a:solidFill>
+                <a:schemeClr val="tx1">
+                  <a:lumMod val="50000"/>
+                  <a:lumOff val="50000"/>
+                </a:schemeClr>
+              </a:solidFill>
+            </a:endParaRPr>
           </a:p>
         </p:txBody>
       </p:sp>
       <p:sp>
         <p:nvSpPr>
-          <p:cNvPr id="3" name="Content Placeholder 2"/>
-          <p:cNvSpPr>
-            <a:spLocks noGrp="1"/>
-          </p:cNvSpPr>
-          <p:nvPr>
-            <p:ph idx="1"/>
-          </p:nvPr>
+          <p:cNvPr id="7" name="Прямоугольник 6"/>
+          <p:cNvSpPr/>
+          <p:nvPr/>
         </p:nvSpPr>
-        <p:spPr/>
+        <p:spPr>
+          <a:xfrm>
+            <a:off x="7668344" y="5301208"/>
+            <a:ext cx="864096" cy="432048"/>
+          </a:xfrm>
+          <a:prstGeom prst="rect">
+            <a:avLst/>
+          </a:prstGeom>
+          <a:noFill/>
+          <a:ln>
+            <a:noFill/>
+          </a:ln>
+        </p:spPr>
+        <p:style>
+          <a:lnRef idx="2">
+            <a:schemeClr val="accent1">
+              <a:shade val="50000"/>
+            </a:schemeClr>
+          </a:lnRef>
+          <a:fillRef idx="1">
+            <a:schemeClr val="accent1"/>
+          </a:fillRef>
+          <a:effectRef idx="0">
+            <a:schemeClr val="accent1"/>
+          </a:effectRef>
+          <a:fontRef idx="minor">
+            <a:schemeClr val="lt1"/>
+          </a:fontRef>
+        </p:style>
         <p:txBody>
-          <a:bodyPr/>
+          <a:bodyPr rtlCol="0" anchor="ctr"/>
           <a:lstStyle/>
           <a:p>
-            <a:pPr marL="68580" indent="0" algn="just">
-              <a:buNone/>
-            </a:pPr>
-            <a:endParaRPr lang="en-US" dirty="0" smtClean="0"/>
-          </a:p>
-          <a:p>
-            <a:pPr algn="just"/>
+            <a:pPr algn="ctr"/>
             <a:r>
-              <a:rPr lang="en-US" dirty="0" smtClean="0"/>
-              <a:t>Cross-validation technique to analyze accuracy of obtained classifier.</a:t>
+              <a:rPr lang="en-US" dirty="0" smtClean="0">
+                <a:solidFill>
+                  <a:schemeClr val="tx1">
+                    <a:lumMod val="50000"/>
+                    <a:lumOff val="50000"/>
+                  </a:schemeClr>
+                </a:solidFill>
+              </a:rPr>
+              <a:t>labels</a:t>
             </a:r>
-          </a:p>
-          <a:p>
-            <a:pPr algn="just"/>
-            <a:r>
-              <a:rPr lang="en-US" dirty="0" smtClean="0"/>
-              <a:t>Desktop application for executing cross-validation on different datasets.</a:t>
-            </a:r>
+            <a:endParaRPr lang="ru-RU" dirty="0">
+              <a:solidFill>
+                <a:schemeClr val="tx1">
+                  <a:lumMod val="50000"/>
+                  <a:lumOff val="50000"/>
+                </a:schemeClr>
+              </a:solidFill>
+            </a:endParaRPr>
           </a:p>
         </p:txBody>
       </p:sp>
+      <p:cxnSp>
+        <p:nvCxnSpPr>
+          <p:cNvPr id="9" name="Прямая со стрелкой 8"/>
+          <p:cNvCxnSpPr/>
+          <p:nvPr/>
+        </p:nvCxnSpPr>
+        <p:spPr>
+          <a:xfrm flipH="1">
+            <a:off x="1907704" y="2780928"/>
+            <a:ext cx="1872208" cy="360040"/>
+          </a:xfrm>
+          <a:prstGeom prst="straightConnector1">
+            <a:avLst/>
+          </a:prstGeom>
+          <a:ln>
+            <a:tailEnd type="arrow"/>
+          </a:ln>
+        </p:spPr>
+        <p:style>
+          <a:lnRef idx="1">
+            <a:schemeClr val="accent1"/>
+          </a:lnRef>
+          <a:fillRef idx="0">
+            <a:schemeClr val="accent1"/>
+          </a:fillRef>
+          <a:effectRef idx="0">
+            <a:schemeClr val="accent1"/>
+          </a:effectRef>
+          <a:fontRef idx="minor">
+            <a:schemeClr val="tx1"/>
+          </a:fontRef>
+        </p:style>
+      </p:cxnSp>
+      <p:cxnSp>
+        <p:nvCxnSpPr>
+          <p:cNvPr id="11" name="Прямая со стрелкой 10"/>
+          <p:cNvCxnSpPr/>
+          <p:nvPr/>
+        </p:nvCxnSpPr>
+        <p:spPr>
+          <a:xfrm flipH="1">
+            <a:off x="3491880" y="2780928"/>
+            <a:ext cx="360040" cy="360040"/>
+          </a:xfrm>
+          <a:prstGeom prst="straightConnector1">
+            <a:avLst/>
+          </a:prstGeom>
+          <a:ln>
+            <a:tailEnd type="arrow"/>
+          </a:ln>
+        </p:spPr>
+        <p:style>
+          <a:lnRef idx="1">
+            <a:schemeClr val="accent1"/>
+          </a:lnRef>
+          <a:fillRef idx="0">
+            <a:schemeClr val="accent1"/>
+          </a:fillRef>
+          <a:effectRef idx="0">
+            <a:schemeClr val="accent1"/>
+          </a:effectRef>
+          <a:fontRef idx="minor">
+            <a:schemeClr val="tx1"/>
+          </a:fontRef>
+        </p:style>
+      </p:cxnSp>
+      <p:cxnSp>
+        <p:nvCxnSpPr>
+          <p:cNvPr id="13" name="Прямая со стрелкой 12"/>
+          <p:cNvCxnSpPr>
+            <a:stCxn id="6" idx="2"/>
+          </p:cNvCxnSpPr>
+          <p:nvPr/>
+        </p:nvCxnSpPr>
+        <p:spPr>
+          <a:xfrm>
+            <a:off x="4031940" y="2775907"/>
+            <a:ext cx="612068" cy="360040"/>
+          </a:xfrm>
+          <a:prstGeom prst="straightConnector1">
+            <a:avLst/>
+          </a:prstGeom>
+          <a:ln>
+            <a:tailEnd type="arrow"/>
+          </a:ln>
+        </p:spPr>
+        <p:style>
+          <a:lnRef idx="1">
+            <a:schemeClr val="accent1"/>
+          </a:lnRef>
+          <a:fillRef idx="0">
+            <a:schemeClr val="accent1"/>
+          </a:fillRef>
+          <a:effectRef idx="0">
+            <a:schemeClr val="accent1"/>
+          </a:effectRef>
+          <a:fontRef idx="minor">
+            <a:schemeClr val="tx1"/>
+          </a:fontRef>
+        </p:style>
+      </p:cxnSp>
+      <p:cxnSp>
+        <p:nvCxnSpPr>
+          <p:cNvPr id="15" name="Прямая со стрелкой 14"/>
+          <p:cNvCxnSpPr/>
+          <p:nvPr/>
+        </p:nvCxnSpPr>
+        <p:spPr>
+          <a:xfrm>
+            <a:off x="4409982" y="2780928"/>
+            <a:ext cx="1530170" cy="360040"/>
+          </a:xfrm>
+          <a:prstGeom prst="straightConnector1">
+            <a:avLst/>
+          </a:prstGeom>
+          <a:ln>
+            <a:tailEnd type="arrow"/>
+          </a:ln>
+        </p:spPr>
+        <p:style>
+          <a:lnRef idx="1">
+            <a:schemeClr val="accent1"/>
+          </a:lnRef>
+          <a:fillRef idx="0">
+            <a:schemeClr val="accent1"/>
+          </a:fillRef>
+          <a:effectRef idx="0">
+            <a:schemeClr val="accent1"/>
+          </a:effectRef>
+          <a:fontRef idx="minor">
+            <a:schemeClr val="tx1"/>
+          </a:fontRef>
+        </p:style>
+      </p:cxnSp>
+      <p:cxnSp>
+        <p:nvCxnSpPr>
+          <p:cNvPr id="17" name="Прямая со стрелкой 16"/>
+          <p:cNvCxnSpPr>
+            <a:stCxn id="7" idx="0"/>
+          </p:cNvCxnSpPr>
+          <p:nvPr/>
+        </p:nvCxnSpPr>
+        <p:spPr>
+          <a:xfrm flipH="1" flipV="1">
+            <a:off x="7812360" y="3717032"/>
+            <a:ext cx="288032" cy="1584176"/>
+          </a:xfrm>
+          <a:prstGeom prst="straightConnector1">
+            <a:avLst/>
+          </a:prstGeom>
+          <a:ln>
+            <a:tailEnd type="arrow"/>
+          </a:ln>
+        </p:spPr>
+        <p:style>
+          <a:lnRef idx="1">
+            <a:schemeClr val="accent1"/>
+          </a:lnRef>
+          <a:fillRef idx="0">
+            <a:schemeClr val="accent1"/>
+          </a:fillRef>
+          <a:effectRef idx="0">
+            <a:schemeClr val="accent1"/>
+          </a:effectRef>
+          <a:fontRef idx="minor">
+            <a:schemeClr val="tx1"/>
+          </a:fontRef>
+        </p:style>
+      </p:cxnSp>
+      <p:cxnSp>
+        <p:nvCxnSpPr>
+          <p:cNvPr id="19" name="Прямая со стрелкой 18"/>
+          <p:cNvCxnSpPr>
+            <a:stCxn id="7" idx="0"/>
+          </p:cNvCxnSpPr>
+          <p:nvPr/>
+        </p:nvCxnSpPr>
+        <p:spPr>
+          <a:xfrm flipH="1" flipV="1">
+            <a:off x="7812360" y="4797152"/>
+            <a:ext cx="288032" cy="504056"/>
+          </a:xfrm>
+          <a:prstGeom prst="straightConnector1">
+            <a:avLst/>
+          </a:prstGeom>
+          <a:ln>
+            <a:tailEnd type="arrow"/>
+          </a:ln>
+        </p:spPr>
+        <p:style>
+          <a:lnRef idx="1">
+            <a:schemeClr val="accent1"/>
+          </a:lnRef>
+          <a:fillRef idx="0">
+            <a:schemeClr val="accent1"/>
+          </a:fillRef>
+          <a:effectRef idx="0">
+            <a:schemeClr val="accent1"/>
+          </a:effectRef>
+          <a:fontRef idx="minor">
+            <a:schemeClr val="tx1"/>
+          </a:fontRef>
+        </p:style>
+      </p:cxnSp>
+      <p:sp>
+        <p:nvSpPr>
+          <p:cNvPr id="21" name="Прямоугольник 20"/>
+          <p:cNvSpPr/>
+          <p:nvPr/>
+        </p:nvSpPr>
+        <p:spPr>
+          <a:xfrm>
+            <a:off x="521550" y="5301208"/>
+            <a:ext cx="1224136" cy="432048"/>
+          </a:xfrm>
+          <a:prstGeom prst="rect">
+            <a:avLst/>
+          </a:prstGeom>
+          <a:noFill/>
+          <a:ln>
+            <a:noFill/>
+          </a:ln>
+        </p:spPr>
+        <p:style>
+          <a:lnRef idx="2">
+            <a:schemeClr val="accent1">
+              <a:shade val="50000"/>
+            </a:schemeClr>
+          </a:lnRef>
+          <a:fillRef idx="1">
+            <a:schemeClr val="accent1"/>
+          </a:fillRef>
+          <a:effectRef idx="0">
+            <a:schemeClr val="accent1"/>
+          </a:effectRef>
+          <a:fontRef idx="minor">
+            <a:schemeClr val="lt1"/>
+          </a:fontRef>
+        </p:style>
+        <p:txBody>
+          <a:bodyPr rtlCol="0" anchor="ctr"/>
+          <a:lstStyle/>
+          <a:p>
+            <a:pPr algn="ctr"/>
+            <a:r>
+              <a:rPr lang="en-US" dirty="0" smtClean="0">
+                <a:solidFill>
+                  <a:schemeClr val="tx1">
+                    <a:lumMod val="50000"/>
+                    <a:lumOff val="50000"/>
+                  </a:schemeClr>
+                </a:solidFill>
+              </a:rPr>
+              <a:t>instances</a:t>
+            </a:r>
+            <a:endParaRPr lang="ru-RU" dirty="0">
+              <a:solidFill>
+                <a:schemeClr val="tx1">
+                  <a:lumMod val="50000"/>
+                  <a:lumOff val="50000"/>
+                </a:schemeClr>
+              </a:solidFill>
+            </a:endParaRPr>
+          </a:p>
+        </p:txBody>
+      </p:sp>
+      <p:cxnSp>
+        <p:nvCxnSpPr>
+          <p:cNvPr id="23" name="Прямая со стрелкой 22"/>
+          <p:cNvCxnSpPr/>
+          <p:nvPr/>
+        </p:nvCxnSpPr>
+        <p:spPr>
+          <a:xfrm flipV="1">
+            <a:off x="899592" y="3717032"/>
+            <a:ext cx="396044" cy="1584176"/>
+          </a:xfrm>
+          <a:prstGeom prst="straightConnector1">
+            <a:avLst/>
+          </a:prstGeom>
+          <a:ln>
+            <a:tailEnd type="arrow"/>
+          </a:ln>
+        </p:spPr>
+        <p:style>
+          <a:lnRef idx="1">
+            <a:schemeClr val="accent1"/>
+          </a:lnRef>
+          <a:fillRef idx="0">
+            <a:schemeClr val="accent1"/>
+          </a:fillRef>
+          <a:effectRef idx="0">
+            <a:schemeClr val="accent1"/>
+          </a:effectRef>
+          <a:fontRef idx="minor">
+            <a:schemeClr val="tx1"/>
+          </a:fontRef>
+        </p:style>
+      </p:cxnSp>
+      <p:cxnSp>
+        <p:nvCxnSpPr>
+          <p:cNvPr id="25" name="Прямая со стрелкой 24"/>
+          <p:cNvCxnSpPr/>
+          <p:nvPr/>
+        </p:nvCxnSpPr>
+        <p:spPr>
+          <a:xfrm flipV="1">
+            <a:off x="971600" y="4797152"/>
+            <a:ext cx="324036" cy="504056"/>
+          </a:xfrm>
+          <a:prstGeom prst="straightConnector1">
+            <a:avLst/>
+          </a:prstGeom>
+          <a:ln>
+            <a:tailEnd type="arrow"/>
+          </a:ln>
+        </p:spPr>
+        <p:style>
+          <a:lnRef idx="1">
+            <a:schemeClr val="accent1"/>
+          </a:lnRef>
+          <a:fillRef idx="0">
+            <a:schemeClr val="accent1"/>
+          </a:fillRef>
+          <a:effectRef idx="0">
+            <a:schemeClr val="accent1"/>
+          </a:effectRef>
+          <a:fontRef idx="minor">
+            <a:schemeClr val="tx1"/>
+          </a:fontRef>
+        </p:style>
+      </p:cxnSp>
     </p:spTree>
     <p:extLst>
       <p:ext uri="{BB962C8B-B14F-4D97-AF65-F5344CB8AC3E}">
-        <p14:creationId xmlns:p14="http://schemas.microsoft.com/office/powerpoint/2010/main" val="963866837"/>
+        <p14:creationId xmlns:p14="http://schemas.microsoft.com/office/powerpoint/2010/main" val="3158954444"/>
       </p:ext>
     </p:extLst>
   </p:cSld>
@@ -13943,7 +14399,12 @@
             <p:ph type="title"/>
           </p:nvPr>
         </p:nvSpPr>
-        <p:spPr/>
+        <p:spPr>
+          <a:xfrm>
+            <a:off x="1043490" y="1027664"/>
+            <a:ext cx="7024744" cy="828000"/>
+          </a:xfrm>
+        </p:spPr>
         <p:txBody>
           <a:bodyPr/>
           <a:lstStyle/>
@@ -13955,25 +14416,35 @@
           </a:p>
         </p:txBody>
       </p:sp>
-      <p:sp>
-        <p:nvSpPr>
-          <p:cNvPr id="3" name="Content Placeholder 2"/>
-          <p:cNvSpPr>
-            <a:spLocks noGrp="1"/>
-          </p:cNvSpPr>
+      <p:pic>
+        <p:nvPicPr>
+          <p:cNvPr id="6" name="Объект 5"/>
+          <p:cNvPicPr>
+            <a:picLocks noGrp="1" noChangeAspect="1"/>
+          </p:cNvPicPr>
           <p:nvPr>
             <p:ph idx="1"/>
           </p:nvPr>
-        </p:nvSpPr>
-        <p:spPr/>
-        <p:txBody>
-          <a:bodyPr/>
-          <a:lstStyle/>
-          <a:p>
-            <a:endParaRPr lang="en-US" dirty="0"/>
-          </a:p>
-        </p:txBody>
-      </p:sp>
+        </p:nvPicPr>
+        <p:blipFill>
+          <a:blip r:embed="rId2">
+            <a:extLst>
+              <a:ext uri="{28A0092B-C50C-407E-A947-70E740481C1C}">
+                <a14:useLocalDpi xmlns:a14="http://schemas.microsoft.com/office/drawing/2010/main" val="0"/>
+              </a:ext>
+            </a:extLst>
+          </a:blip>
+          <a:stretch>
+            <a:fillRect/>
+          </a:stretch>
+        </p:blipFill>
+        <p:spPr>
+          <a:xfrm>
+            <a:off x="1403648" y="1844824"/>
+            <a:ext cx="6264696" cy="4610947"/>
+          </a:xfrm>
+        </p:spPr>
+      </p:pic>
     </p:spTree>
     <p:extLst>
       <p:ext uri="{BB962C8B-B14F-4D97-AF65-F5344CB8AC3E}">
@@ -13995,6 +14466,184 @@
 </file>
 
 <file path=ppt/slides/slide12.xml><?xml version="1.0" encoding="utf-8"?>
+<p:sld xmlns:a="http://schemas.openxmlformats.org/drawingml/2006/main" xmlns:r="http://schemas.openxmlformats.org/officeDocument/2006/relationships" xmlns:p="http://schemas.openxmlformats.org/presentationml/2006/main">
+  <p:cSld>
+    <p:spTree>
+      <p:nvGrpSpPr>
+        <p:cNvPr id="1" name=""/>
+        <p:cNvGrpSpPr/>
+        <p:nvPr/>
+      </p:nvGrpSpPr>
+      <p:grpSpPr>
+        <a:xfrm>
+          <a:off x="0" y="0"/>
+          <a:ext cx="0" cy="0"/>
+          <a:chOff x="0" y="0"/>
+          <a:chExt cx="0" cy="0"/>
+        </a:xfrm>
+      </p:grpSpPr>
+      <p:sp>
+        <p:nvSpPr>
+          <p:cNvPr id="2" name="Заголовок 1"/>
+          <p:cNvSpPr>
+            <a:spLocks noGrp="1"/>
+          </p:cNvSpPr>
+          <p:nvPr>
+            <p:ph type="title"/>
+          </p:nvPr>
+        </p:nvSpPr>
+        <p:spPr>
+          <a:xfrm>
+            <a:off x="1043490" y="1027664"/>
+            <a:ext cx="7024744" cy="828000"/>
+          </a:xfrm>
+        </p:spPr>
+        <p:txBody>
+          <a:bodyPr/>
+          <a:lstStyle/>
+          <a:p>
+            <a:r>
+              <a:rPr lang="en-US" dirty="0"/>
+              <a:t>3. Experiments</a:t>
+            </a:r>
+            <a:endParaRPr lang="ru-RU" dirty="0"/>
+          </a:p>
+        </p:txBody>
+      </p:sp>
+      <p:pic>
+        <p:nvPicPr>
+          <p:cNvPr id="6" name="Объект 5"/>
+          <p:cNvPicPr>
+            <a:picLocks noGrp="1" noChangeAspect="1"/>
+          </p:cNvPicPr>
+          <p:nvPr>
+            <p:ph idx="1"/>
+          </p:nvPr>
+        </p:nvPicPr>
+        <p:blipFill>
+          <a:blip r:embed="rId2">
+            <a:extLst>
+              <a:ext uri="{28A0092B-C50C-407E-A947-70E740481C1C}">
+                <a14:useLocalDpi xmlns:a14="http://schemas.microsoft.com/office/drawing/2010/main" val="0"/>
+              </a:ext>
+            </a:extLst>
+          </a:blip>
+          <a:stretch>
+            <a:fillRect/>
+          </a:stretch>
+        </p:blipFill>
+        <p:spPr>
+          <a:xfrm>
+            <a:off x="1187624" y="1772816"/>
+            <a:ext cx="6912768" cy="4647805"/>
+          </a:xfrm>
+        </p:spPr>
+      </p:pic>
+    </p:spTree>
+    <p:extLst>
+      <p:ext uri="{BB962C8B-B14F-4D97-AF65-F5344CB8AC3E}">
+        <p14:creationId xmlns:p14="http://schemas.microsoft.com/office/powerpoint/2010/main" val="4143550584"/>
+      </p:ext>
+    </p:extLst>
+  </p:cSld>
+  <p:clrMapOvr>
+    <a:masterClrMapping/>
+  </p:clrMapOvr>
+  <p:timing>
+    <p:tnLst>
+      <p:par>
+        <p:cTn id="1" dur="indefinite" restart="never" nodeType="tmRoot"/>
+      </p:par>
+    </p:tnLst>
+  </p:timing>
+</p:sld>
+</file>
+
+<file path=ppt/slides/slide13.xml><?xml version="1.0" encoding="utf-8"?>
+<p:sld xmlns:a="http://schemas.openxmlformats.org/drawingml/2006/main" xmlns:r="http://schemas.openxmlformats.org/officeDocument/2006/relationships" xmlns:p="http://schemas.openxmlformats.org/presentationml/2006/main">
+  <p:cSld>
+    <p:spTree>
+      <p:nvGrpSpPr>
+        <p:cNvPr id="1" name=""/>
+        <p:cNvGrpSpPr/>
+        <p:nvPr/>
+      </p:nvGrpSpPr>
+      <p:grpSpPr>
+        <a:xfrm>
+          <a:off x="0" y="0"/>
+          <a:ext cx="0" cy="0"/>
+          <a:chOff x="0" y="0"/>
+          <a:chExt cx="0" cy="0"/>
+        </a:xfrm>
+      </p:grpSpPr>
+      <p:sp>
+        <p:nvSpPr>
+          <p:cNvPr id="2" name="Заголовок 1"/>
+          <p:cNvSpPr>
+            <a:spLocks noGrp="1"/>
+          </p:cNvSpPr>
+          <p:nvPr>
+            <p:ph type="title"/>
+          </p:nvPr>
+        </p:nvSpPr>
+        <p:spPr>
+          <a:xfrm>
+            <a:off x="1043490" y="1027664"/>
+            <a:ext cx="7024744" cy="828000"/>
+          </a:xfrm>
+        </p:spPr>
+        <p:txBody>
+          <a:bodyPr/>
+          <a:lstStyle/>
+          <a:p>
+            <a:r>
+              <a:rPr lang="en-US" dirty="0" smtClean="0"/>
+              <a:t>Conclusion</a:t>
+            </a:r>
+            <a:endParaRPr lang="ru-RU" dirty="0"/>
+          </a:p>
+        </p:txBody>
+      </p:sp>
+      <p:sp>
+        <p:nvSpPr>
+          <p:cNvPr id="3" name="Объект 2"/>
+          <p:cNvSpPr>
+            <a:spLocks noGrp="1"/>
+          </p:cNvSpPr>
+          <p:nvPr>
+            <p:ph idx="1"/>
+          </p:nvPr>
+        </p:nvSpPr>
+        <p:spPr/>
+        <p:txBody>
+          <a:bodyPr/>
+          <a:lstStyle/>
+          <a:p>
+            <a:endParaRPr lang="ru-RU"/>
+          </a:p>
+        </p:txBody>
+      </p:sp>
+    </p:spTree>
+    <p:extLst>
+      <p:ext uri="{BB962C8B-B14F-4D97-AF65-F5344CB8AC3E}">
+        <p14:creationId xmlns:p14="http://schemas.microsoft.com/office/powerpoint/2010/main" val="389306213"/>
+      </p:ext>
+    </p:extLst>
+  </p:cSld>
+  <p:clrMapOvr>
+    <a:masterClrMapping/>
+  </p:clrMapOvr>
+  <p:timing>
+    <p:tnLst>
+      <p:par>
+        <p:cTn id="1" dur="indefinite" restart="never" nodeType="tmRoot"/>
+      </p:par>
+    </p:tnLst>
+  </p:timing>
+</p:sld>
+</file>
+
+<file path=ppt/slides/slide14.xml><?xml version="1.0" encoding="utf-8"?>
 <p:sld xmlns:a="http://schemas.openxmlformats.org/drawingml/2006/main" xmlns:r="http://schemas.openxmlformats.org/officeDocument/2006/relationships" xmlns:p="http://schemas.openxmlformats.org/presentationml/2006/main">
   <p:cSld>
     <p:spTree>
@@ -14089,7 +14738,12 @@
             <p:ph type="title"/>
           </p:nvPr>
         </p:nvSpPr>
-        <p:spPr/>
+        <p:spPr>
+          <a:xfrm>
+            <a:off x="1043490" y="1027664"/>
+            <a:ext cx="7024744" cy="828000"/>
+          </a:xfrm>
+        </p:spPr>
         <p:txBody>
           <a:bodyPr/>
           <a:lstStyle/>
@@ -14125,15 +14779,13 @@
             <a:pPr marL="68580" indent="0" algn="just">
               <a:buNone/>
             </a:pPr>
-            <a:endParaRPr lang="en-US" dirty="0" smtClean="0"/>
-          </a:p>
-          <a:p>
-            <a:pPr marL="68580" indent="0" algn="just">
-              <a:buNone/>
-            </a:pPr>
             <a:r>
               <a:rPr lang="en-US" dirty="0" smtClean="0"/>
-              <a:t>Measurement of human’s indoor movements is useful for analyzing treatment progress of depressed people. It shows how actively person behaves, and gives objective view of his or her psychological condition.</a:t>
+              <a:t>Measurement </a:t>
+            </a:r>
+            <a:r>
+              <a:rPr lang="en-US" dirty="0" smtClean="0"/>
+              <a:t>of human’s indoor movements is useful for analyzing treatment progress of depressed people. It shows how actively person behaves, and gives objective view of his or her psychological condition.</a:t>
             </a:r>
           </a:p>
         </p:txBody>
@@ -14215,7 +14867,12 @@
             <p:ph type="title"/>
           </p:nvPr>
         </p:nvSpPr>
-        <p:spPr/>
+        <p:spPr>
+          <a:xfrm>
+            <a:off x="1043490" y="1027664"/>
+            <a:ext cx="7024744" cy="828000"/>
+          </a:xfrm>
+        </p:spPr>
         <p:txBody>
           <a:bodyPr/>
           <a:lstStyle/>
@@ -14243,9 +14900,6 @@
           <a:bodyPr/>
           <a:lstStyle/>
           <a:p>
-            <a:endParaRPr lang="en-US" dirty="0" smtClean="0"/>
-          </a:p>
-          <a:p>
             <a:pPr marL="525780" indent="-457200">
               <a:buFont typeface="+mj-lt"/>
               <a:buAutoNum type="arabicPeriod"/>
@@ -14254,6 +14908,7 @@
               <a:rPr lang="en-US" dirty="0" smtClean="0"/>
               <a:t>Approach</a:t>
             </a:r>
+            <a:endParaRPr lang="en-US" dirty="0" smtClean="0"/>
           </a:p>
           <a:p>
             <a:pPr marL="525780" indent="-457200">
@@ -14324,7 +14979,12 @@
             <p:ph type="title"/>
           </p:nvPr>
         </p:nvSpPr>
-        <p:spPr/>
+        <p:spPr>
+          <a:xfrm>
+            <a:off x="1043490" y="1027664"/>
+            <a:ext cx="7024744" cy="828000"/>
+          </a:xfrm>
+        </p:spPr>
         <p:txBody>
           <a:bodyPr>
             <a:normAutofit/>
@@ -14357,15 +15017,13 @@
             <a:pPr marL="68580" indent="0" algn="just">
               <a:buNone/>
             </a:pPr>
-            <a:endParaRPr lang="en-US" dirty="0" smtClean="0"/>
-          </a:p>
-          <a:p>
-            <a:pPr marL="68580" indent="0" algn="just">
-              <a:buNone/>
-            </a:pPr>
             <a:r>
               <a:rPr lang="en-US" dirty="0" smtClean="0"/>
-              <a:t>Analysis of surrounding Wi-Fi networks to retrieve person’s indoor position:</a:t>
+              <a:t>Analysis </a:t>
+            </a:r>
+            <a:r>
+              <a:rPr lang="en-US" dirty="0" smtClean="0"/>
+              <a:t>of surrounding Wi-Fi networks to retrieve person’s indoor position:</a:t>
             </a:r>
           </a:p>
           <a:p>
@@ -14391,15 +15049,7 @@
             </a:r>
             <a:r>
               <a:rPr lang="en-US" sz="2000" dirty="0" smtClean="0"/>
-              <a:t>ombining this information we </a:t>
-            </a:r>
-            <a:r>
-              <a:rPr lang="en-US" sz="2000" dirty="0" smtClean="0"/>
-              <a:t>infer person’s </a:t>
-            </a:r>
-            <a:r>
-              <a:rPr lang="en-US" sz="2000" dirty="0" smtClean="0"/>
-              <a:t>position.</a:t>
+              <a:t>ombining this information we infer person’s position.</a:t>
             </a:r>
             <a:endParaRPr lang="en-US" sz="2000" dirty="0"/>
           </a:p>
@@ -14452,7 +15102,12 @@
             <p:ph type="title"/>
           </p:nvPr>
         </p:nvSpPr>
-        <p:spPr/>
+        <p:spPr>
+          <a:xfrm>
+            <a:off x="1043490" y="1027664"/>
+            <a:ext cx="7024744" cy="828000"/>
+          </a:xfrm>
+        </p:spPr>
         <p:txBody>
           <a:bodyPr/>
           <a:lstStyle/>
@@ -14541,7 +15196,12 @@
             <p:ph type="title"/>
           </p:nvPr>
         </p:nvSpPr>
-        <p:spPr/>
+        <p:spPr>
+          <a:xfrm>
+            <a:off x="1043490" y="1027664"/>
+            <a:ext cx="7024744" cy="828000"/>
+          </a:xfrm>
+        </p:spPr>
         <p:txBody>
           <a:bodyPr/>
           <a:lstStyle/>
@@ -14554,69 +15214,158 @@
           </a:p>
         </p:txBody>
       </p:sp>
-      <p:sp>
-        <p:nvSpPr>
-          <p:cNvPr id="3" name="Content Placeholder 2"/>
-          <p:cNvSpPr>
-            <a:spLocks noGrp="1"/>
-          </p:cNvSpPr>
+      <p:pic>
+        <p:nvPicPr>
+          <p:cNvPr id="4" name="Picture 3"/>
+          <p:cNvPicPr>
+            <a:picLocks noGrp="1" noChangeAspect="1"/>
+          </p:cNvPicPr>
           <p:nvPr>
             <p:ph idx="1"/>
           </p:nvPr>
-        </p:nvSpPr>
-        <p:spPr/>
-        <p:txBody>
-          <a:bodyPr/>
-          <a:lstStyle/>
-          <a:p>
-            <a:pPr algn="just"/>
-            <a:endParaRPr lang="en-US" dirty="0" smtClean="0"/>
-          </a:p>
-          <a:p>
-            <a:pPr algn="just"/>
-            <a:r>
-              <a:rPr lang="en-US" dirty="0" smtClean="0"/>
-              <a:t>Application for Android</a:t>
-            </a:r>
-          </a:p>
-          <a:p>
-            <a:pPr algn="just"/>
-            <a:r>
-              <a:rPr lang="en-US" dirty="0"/>
-              <a:t>Machine learning techniques</a:t>
-            </a:r>
-          </a:p>
-          <a:p>
-            <a:pPr marL="708660" lvl="1" indent="-342900" algn="just">
-              <a:buFont typeface="+mj-lt"/>
-              <a:buAutoNum type="arabicPeriod"/>
-            </a:pPr>
-            <a:r>
-              <a:rPr lang="en-US" sz="1800" b="1" dirty="0"/>
-              <a:t>k nearest neighbors</a:t>
-            </a:r>
-            <a:r>
-              <a:rPr lang="en-US" sz="1800" dirty="0"/>
-              <a:t> algorithm</a:t>
-            </a:r>
-          </a:p>
-          <a:p>
-            <a:pPr marL="708660" lvl="1" indent="-342900" algn="just">
-              <a:buFont typeface="+mj-lt"/>
-              <a:buAutoNum type="arabicPeriod"/>
-            </a:pPr>
-            <a:r>
-              <a:rPr lang="en-US" sz="1800" b="1" dirty="0"/>
-              <a:t>neural </a:t>
-            </a:r>
-            <a:r>
-              <a:rPr lang="en-US" sz="1800" b="1" dirty="0" smtClean="0"/>
-              <a:t>network</a:t>
-            </a:r>
-            <a:endParaRPr lang="en-US" dirty="0" smtClean="0"/>
-          </a:p>
-        </p:txBody>
-      </p:sp>
+        </p:nvPicPr>
+        <p:blipFill>
+          <a:blip r:embed="rId2" cstate="print">
+            <a:extLst>
+              <a:ext uri="{28A0092B-C50C-407E-A947-70E740481C1C}">
+                <a14:useLocalDpi xmlns:a14="http://schemas.microsoft.com/office/drawing/2010/main" val="0"/>
+              </a:ext>
+            </a:extLst>
+          </a:blip>
+          <a:stretch>
+            <a:fillRect/>
+          </a:stretch>
+        </p:blipFill>
+        <p:spPr>
+          <a:xfrm>
+            <a:off x="611560" y="2492896"/>
+            <a:ext cx="2160240" cy="3839768"/>
+          </a:xfrm>
+          <a:prstGeom prst="rect">
+            <a:avLst/>
+          </a:prstGeom>
+        </p:spPr>
+      </p:pic>
+      <p:pic>
+        <p:nvPicPr>
+          <p:cNvPr id="5" name="Picture 6"/>
+          <p:cNvPicPr>
+            <a:picLocks noChangeAspect="1"/>
+          </p:cNvPicPr>
+          <p:nvPr/>
+        </p:nvPicPr>
+        <p:blipFill>
+          <a:blip r:embed="rId3" cstate="print">
+            <a:extLst>
+              <a:ext uri="{28A0092B-C50C-407E-A947-70E740481C1C}">
+                <a14:useLocalDpi xmlns:a14="http://schemas.microsoft.com/office/drawing/2010/main" val="0"/>
+              </a:ext>
+            </a:extLst>
+          </a:blip>
+          <a:stretch>
+            <a:fillRect/>
+          </a:stretch>
+        </p:blipFill>
+        <p:spPr>
+          <a:xfrm>
+            <a:off x="3491880" y="2498427"/>
+            <a:ext cx="2160240" cy="3840427"/>
+          </a:xfrm>
+          <a:prstGeom prst="rect">
+            <a:avLst/>
+          </a:prstGeom>
+        </p:spPr>
+      </p:pic>
+      <p:pic>
+        <p:nvPicPr>
+          <p:cNvPr id="6" name="Picture 7"/>
+          <p:cNvPicPr>
+            <a:picLocks noChangeAspect="1"/>
+          </p:cNvPicPr>
+          <p:nvPr/>
+        </p:nvPicPr>
+        <p:blipFill>
+          <a:blip r:embed="rId4" cstate="print">
+            <a:extLst>
+              <a:ext uri="{28A0092B-C50C-407E-A947-70E740481C1C}">
+                <a14:useLocalDpi xmlns:a14="http://schemas.microsoft.com/office/drawing/2010/main" val="0"/>
+              </a:ext>
+            </a:extLst>
+          </a:blip>
+          <a:stretch>
+            <a:fillRect/>
+          </a:stretch>
+        </p:blipFill>
+        <p:spPr>
+          <a:xfrm>
+            <a:off x="6444208" y="2492896"/>
+            <a:ext cx="2160240" cy="3840427"/>
+          </a:xfrm>
+          <a:prstGeom prst="rect">
+            <a:avLst/>
+          </a:prstGeom>
+        </p:spPr>
+      </p:pic>
+      <p:pic>
+        <p:nvPicPr>
+          <p:cNvPr id="7" name="Рисунок 6"/>
+          <p:cNvPicPr>
+            <a:picLocks noChangeAspect="1"/>
+          </p:cNvPicPr>
+          <p:nvPr/>
+        </p:nvPicPr>
+        <p:blipFill>
+          <a:blip r:embed="rId5">
+            <a:extLst>
+              <a:ext uri="{28A0092B-C50C-407E-A947-70E740481C1C}">
+                <a14:useLocalDpi xmlns:a14="http://schemas.microsoft.com/office/drawing/2010/main" val="0"/>
+              </a:ext>
+            </a:extLst>
+          </a:blip>
+          <a:stretch>
+            <a:fillRect/>
+          </a:stretch>
+        </p:blipFill>
+        <p:spPr>
+          <a:xfrm>
+            <a:off x="2915816" y="4077072"/>
+            <a:ext cx="449580" cy="457200"/>
+          </a:xfrm>
+          <a:prstGeom prst="rect">
+            <a:avLst/>
+          </a:prstGeom>
+        </p:spPr>
+      </p:pic>
+      <p:pic>
+        <p:nvPicPr>
+          <p:cNvPr id="8" name="Рисунок 7"/>
+          <p:cNvPicPr>
+            <a:picLocks noChangeAspect="1"/>
+          </p:cNvPicPr>
+          <p:nvPr/>
+        </p:nvPicPr>
+        <p:blipFill>
+          <a:blip r:embed="rId5">
+            <a:extLst>
+              <a:ext uri="{28A0092B-C50C-407E-A947-70E740481C1C}">
+                <a14:useLocalDpi xmlns:a14="http://schemas.microsoft.com/office/drawing/2010/main" val="0"/>
+              </a:ext>
+            </a:extLst>
+          </a:blip>
+          <a:stretch>
+            <a:fillRect/>
+          </a:stretch>
+        </p:blipFill>
+        <p:spPr>
+          <a:xfrm>
+            <a:off x="5868144" y="4077072"/>
+            <a:ext cx="449580" cy="457200"/>
+          </a:xfrm>
+          <a:prstGeom prst="rect">
+            <a:avLst/>
+          </a:prstGeom>
+        </p:spPr>
+      </p:pic>
     </p:spTree>
     <p:extLst>
       <p:ext uri="{BB962C8B-B14F-4D97-AF65-F5344CB8AC3E}">
@@ -14664,7 +15413,12 @@
             <p:ph type="title"/>
           </p:nvPr>
         </p:nvSpPr>
-        <p:spPr/>
+        <p:spPr>
+          <a:xfrm>
+            <a:off x="1043490" y="1027664"/>
+            <a:ext cx="7024744" cy="828000"/>
+          </a:xfrm>
+        </p:spPr>
         <p:txBody>
           <a:bodyPr/>
           <a:lstStyle/>
@@ -14752,7 +15506,12 @@
             <p:ph type="title"/>
           </p:nvPr>
         </p:nvSpPr>
-        <p:spPr/>
+        <p:spPr>
+          <a:xfrm>
+            <a:off x="1043490" y="1027664"/>
+            <a:ext cx="7024744" cy="828000"/>
+          </a:xfrm>
+        </p:spPr>
         <p:txBody>
           <a:bodyPr/>
           <a:lstStyle/>
@@ -14782,14 +15541,8 @@
             <a:pPr marL="68580" indent="0" algn="just">
               <a:buNone/>
             </a:pPr>
-            <a:endParaRPr lang="en-US" b="1" dirty="0" smtClean="0"/>
-          </a:p>
-          <a:p>
-            <a:pPr marL="68580" indent="0" algn="just">
-              <a:buNone/>
-            </a:pPr>
             <a:r>
-              <a:rPr lang="en-US" b="1" dirty="0" smtClean="0"/>
+              <a:rPr lang="en-US" b="1" dirty="0" err="1" smtClean="0"/>
               <a:t>Neuroph</a:t>
             </a:r>
             <a:r>
@@ -14825,7 +15578,7 @@
         </p:blipFill>
         <p:spPr>
           <a:xfrm>
-            <a:off x="2771800" y="4005064"/>
+            <a:off x="2771800" y="3645024"/>
             <a:ext cx="3599703" cy="2409718"/>
           </a:xfrm>
           <a:prstGeom prst="rect">
@@ -14870,190 +15623,74 @@
           <a:chExt cx="0" cy="0"/>
         </a:xfrm>
       </p:grpSpPr>
-      <p:pic>
-        <p:nvPicPr>
-          <p:cNvPr id="3" name="Picture 2"/>
-          <p:cNvPicPr>
-            <a:picLocks noChangeAspect="1"/>
-          </p:cNvPicPr>
-          <p:nvPr/>
-        </p:nvPicPr>
-        <p:blipFill>
-          <a:blip r:embed="rId2" cstate="print">
-            <a:extLst>
-              <a:ext uri="{28A0092B-C50C-407E-A947-70E740481C1C}">
-                <a14:useLocalDpi xmlns:a14="http://schemas.microsoft.com/office/drawing/2010/main" val="0"/>
-              </a:ext>
-            </a:extLst>
-          </a:blip>
-          <a:stretch>
-            <a:fillRect/>
-          </a:stretch>
-        </p:blipFill>
+      <p:sp>
+        <p:nvSpPr>
+          <p:cNvPr id="2" name="Title 1"/>
+          <p:cNvSpPr>
+            <a:spLocks noGrp="1"/>
+          </p:cNvSpPr>
+          <p:nvPr>
+            <p:ph type="title"/>
+          </p:nvPr>
+        </p:nvSpPr>
         <p:spPr>
           <a:xfrm>
-            <a:off x="2051720" y="789620"/>
-            <a:ext cx="1512168" cy="2688299"/>
+            <a:off x="1043490" y="1027664"/>
+            <a:ext cx="7024744" cy="828000"/>
           </a:xfrm>
-          <a:prstGeom prst="rect">
-            <a:avLst/>
-          </a:prstGeom>
         </p:spPr>
-      </p:pic>
-      <p:pic>
-        <p:nvPicPr>
-          <p:cNvPr id="4" name="Picture 3"/>
-          <p:cNvPicPr>
-            <a:picLocks noChangeAspect="1"/>
-          </p:cNvPicPr>
-          <p:nvPr/>
-        </p:nvPicPr>
-        <p:blipFill>
-          <a:blip r:embed="rId3" cstate="print">
-            <a:extLst>
-              <a:ext uri="{28A0092B-C50C-407E-A947-70E740481C1C}">
-                <a14:useLocalDpi xmlns:a14="http://schemas.microsoft.com/office/drawing/2010/main" val="0"/>
-              </a:ext>
-            </a:extLst>
-          </a:blip>
-          <a:stretch>
-            <a:fillRect/>
-          </a:stretch>
-        </p:blipFill>
-        <p:spPr>
-          <a:xfrm>
-            <a:off x="3779912" y="790692"/>
-            <a:ext cx="1512167" cy="2688297"/>
-          </a:xfrm>
-          <a:prstGeom prst="rect">
-            <a:avLst/>
-          </a:prstGeom>
-        </p:spPr>
-      </p:pic>
-      <p:pic>
-        <p:nvPicPr>
-          <p:cNvPr id="6" name="Picture 5"/>
-          <p:cNvPicPr>
-            <a:picLocks noChangeAspect="1"/>
-          </p:cNvPicPr>
-          <p:nvPr/>
-        </p:nvPicPr>
-        <p:blipFill>
-          <a:blip r:embed="rId4" cstate="print">
-            <a:extLst>
-              <a:ext uri="{28A0092B-C50C-407E-A947-70E740481C1C}">
-                <a14:useLocalDpi xmlns:a14="http://schemas.microsoft.com/office/drawing/2010/main" val="0"/>
-              </a:ext>
-            </a:extLst>
-          </a:blip>
-          <a:stretch>
-            <a:fillRect/>
-          </a:stretch>
-        </p:blipFill>
-        <p:spPr>
-          <a:xfrm>
-            <a:off x="5483566" y="788550"/>
-            <a:ext cx="1512770" cy="2689369"/>
-          </a:xfrm>
-          <a:prstGeom prst="rect">
-            <a:avLst/>
-          </a:prstGeom>
-        </p:spPr>
-      </p:pic>
-      <p:pic>
-        <p:nvPicPr>
-          <p:cNvPr id="7" name="Picture 6"/>
-          <p:cNvPicPr>
-            <a:picLocks noChangeAspect="1"/>
-          </p:cNvPicPr>
-          <p:nvPr/>
-        </p:nvPicPr>
-        <p:blipFill>
-          <a:blip r:embed="rId5" cstate="print">
-            <a:extLst>
-              <a:ext uri="{28A0092B-C50C-407E-A947-70E740481C1C}">
-                <a14:useLocalDpi xmlns:a14="http://schemas.microsoft.com/office/drawing/2010/main" val="0"/>
-              </a:ext>
-            </a:extLst>
-          </a:blip>
-          <a:stretch>
-            <a:fillRect/>
-          </a:stretch>
-        </p:blipFill>
-        <p:spPr>
-          <a:xfrm>
-            <a:off x="2051721" y="3571946"/>
-            <a:ext cx="1512168" cy="2688299"/>
-          </a:xfrm>
-          <a:prstGeom prst="rect">
-            <a:avLst/>
-          </a:prstGeom>
-        </p:spPr>
-      </p:pic>
-      <p:pic>
-        <p:nvPicPr>
-          <p:cNvPr id="8" name="Picture 7"/>
-          <p:cNvPicPr>
-            <a:picLocks noChangeAspect="1"/>
-          </p:cNvPicPr>
-          <p:nvPr/>
-        </p:nvPicPr>
-        <p:blipFill>
-          <a:blip r:embed="rId6" cstate="print">
-            <a:extLst>
-              <a:ext uri="{28A0092B-C50C-407E-A947-70E740481C1C}">
-                <a14:useLocalDpi xmlns:a14="http://schemas.microsoft.com/office/drawing/2010/main" val="0"/>
-              </a:ext>
-            </a:extLst>
-          </a:blip>
-          <a:stretch>
-            <a:fillRect/>
-          </a:stretch>
-        </p:blipFill>
-        <p:spPr>
-          <a:xfrm>
-            <a:off x="3779913" y="3571946"/>
-            <a:ext cx="1512168" cy="2688299"/>
-          </a:xfrm>
-          <a:prstGeom prst="rect">
-            <a:avLst/>
-          </a:prstGeom>
-        </p:spPr>
-      </p:pic>
-      <p:pic>
-        <p:nvPicPr>
-          <p:cNvPr id="9" name="Picture 8"/>
-          <p:cNvPicPr>
-            <a:picLocks noChangeAspect="1"/>
-          </p:cNvPicPr>
-          <p:nvPr/>
-        </p:nvPicPr>
-        <p:blipFill>
-          <a:blip r:embed="rId7" cstate="print">
-            <a:extLst>
-              <a:ext uri="{28A0092B-C50C-407E-A947-70E740481C1C}">
-                <a14:useLocalDpi xmlns:a14="http://schemas.microsoft.com/office/drawing/2010/main" val="0"/>
-              </a:ext>
-            </a:extLst>
-          </a:blip>
-          <a:stretch>
-            <a:fillRect/>
-          </a:stretch>
-        </p:blipFill>
-        <p:spPr>
-          <a:xfrm>
-            <a:off x="5483567" y="3571945"/>
-            <a:ext cx="1512770" cy="2688299"/>
-          </a:xfrm>
-          <a:prstGeom prst="rect">
-            <a:avLst/>
-          </a:prstGeom>
-        </p:spPr>
-      </p:pic>
+        <p:txBody>
+          <a:bodyPr/>
+          <a:lstStyle/>
+          <a:p>
+            <a:r>
+              <a:rPr lang="en-US" dirty="0" smtClean="0"/>
+              <a:t>3. Experiments</a:t>
+            </a:r>
+            <a:endParaRPr lang="en-US" dirty="0"/>
+          </a:p>
+        </p:txBody>
+      </p:sp>
+      <p:sp>
+        <p:nvSpPr>
+          <p:cNvPr id="3" name="Content Placeholder 2"/>
+          <p:cNvSpPr>
+            <a:spLocks noGrp="1"/>
+          </p:cNvSpPr>
+          <p:nvPr>
+            <p:ph idx="1"/>
+          </p:nvPr>
+        </p:nvSpPr>
+        <p:spPr/>
+        <p:txBody>
+          <a:bodyPr/>
+          <a:lstStyle/>
+          <a:p>
+            <a:pPr marL="68580" indent="0" algn="just">
+              <a:buNone/>
+            </a:pPr>
+            <a:endParaRPr lang="en-US" dirty="0" smtClean="0"/>
+          </a:p>
+          <a:p>
+            <a:pPr algn="just"/>
+            <a:r>
+              <a:rPr lang="en-US" dirty="0" smtClean="0"/>
+              <a:t>Cross-validation technique to analyze accuracy of obtained classifier.</a:t>
+            </a:r>
+          </a:p>
+          <a:p>
+            <a:pPr algn="just"/>
+            <a:r>
+              <a:rPr lang="en-US" dirty="0" smtClean="0"/>
+              <a:t>Desktop application for executing cross-validation on different datasets.</a:t>
+            </a:r>
+          </a:p>
+        </p:txBody>
+      </p:sp>
     </p:spTree>
     <p:extLst>
       <p:ext uri="{BB962C8B-B14F-4D97-AF65-F5344CB8AC3E}">
-        <p14:creationId xmlns:p14="http://schemas.microsoft.com/office/powerpoint/2010/main" val="2063984816"/>
+        <p14:creationId xmlns:p14="http://schemas.microsoft.com/office/powerpoint/2010/main" val="963866837"/>
       </p:ext>
     </p:extLst>
   </p:cSld>

</xml_diff>

<commit_message>
problems with neuroph lib
</commit_message>
<xml_diff>
--- a/Docs/Data Extraction for the Quantified Self v2.pptx
+++ b/Docs/Data Extraction for the Quantified Self v2.pptx
@@ -14418,7 +14418,7 @@
       </p:sp>
       <p:pic>
         <p:nvPicPr>
-          <p:cNvPr id="6" name="Объект 5"/>
+          <p:cNvPr id="4" name="Объект 3"/>
           <p:cNvPicPr>
             <a:picLocks noGrp="1" noChangeAspect="1"/>
           </p:cNvPicPr>
@@ -14440,8 +14440,8 @@
         </p:blipFill>
         <p:spPr>
           <a:xfrm>
-            <a:off x="1403648" y="1844824"/>
-            <a:ext cx="6264696" cy="4610947"/>
+            <a:off x="1187624" y="2060848"/>
+            <a:ext cx="6043201" cy="4447922"/>
           </a:xfrm>
         </p:spPr>
       </p:pic>
@@ -14512,7 +14512,7 @@
       </p:sp>
       <p:pic>
         <p:nvPicPr>
-          <p:cNvPr id="6" name="Объект 5"/>
+          <p:cNvPr id="5" name="Объект 4"/>
           <p:cNvPicPr>
             <a:picLocks noGrp="1" noChangeAspect="1"/>
           </p:cNvPicPr>
@@ -14534,8 +14534,8 @@
         </p:blipFill>
         <p:spPr>
           <a:xfrm>
-            <a:off x="1187624" y="1772816"/>
-            <a:ext cx="6912768" cy="4647805"/>
+            <a:off x="1115616" y="1772816"/>
+            <a:ext cx="6961425" cy="4680520"/>
           </a:xfrm>
         </p:spPr>
       </p:pic>

</xml_diff>